<commit_message>
Deploying to gh-pages from @ wengzf20/learnjekyll@a1c624e9ff89f10c2ba50096835dd9c7d9fb2184 🚀
</commit_message>
<xml_diff>
--- a/assets/img/publication_preview/template.pptx
+++ b/assets/img/publication_preview/template.pptx
@@ -2973,10 +2973,10 @@
       </p:grpSpPr>
       <p:grpSp>
         <p:nvGrpSpPr>
-          <p:cNvPr id="4" name="Group 3">
+          <p:cNvPr id="42" name="Group 41">
             <a:extLst>
               <a:ext uri="{FF2B5EF4-FFF2-40B4-BE49-F238E27FC236}">
-                <a16:creationId xmlns:a16="http://schemas.microsoft.com/office/drawing/2014/main" id="{E75328EB-3BAC-3245-A8AF-5CED3EBA34F4}"/>
+                <a16:creationId xmlns:a16="http://schemas.microsoft.com/office/drawing/2014/main" id="{25DAFE6D-7421-5843-9483-B178C9982295}"/>
               </a:ext>
             </a:extLst>
           </p:cNvPr>
@@ -2991,66 +2991,195 @@
             <a:chExt cx="3600450" cy="3600450"/>
           </a:xfrm>
         </p:grpSpPr>
-        <p:sp>
-          <p:nvSpPr>
-            <p:cNvPr id="6" name="Rectangle 5">
+        <p:grpSp>
+          <p:nvGrpSpPr>
+            <p:cNvPr id="24" name="Group 23">
               <a:extLst>
                 <a:ext uri="{FF2B5EF4-FFF2-40B4-BE49-F238E27FC236}">
-                  <a16:creationId xmlns:a16="http://schemas.microsoft.com/office/drawing/2014/main" id="{581538FD-95BC-BF43-AC64-D7F26A4660A2}"/>
+                  <a16:creationId xmlns:a16="http://schemas.microsoft.com/office/drawing/2014/main" id="{A17B2B4D-D256-2B44-A8A4-8B2724790003}"/>
                 </a:ext>
               </a:extLst>
             </p:cNvPr>
-            <p:cNvSpPr/>
+            <p:cNvGrpSpPr/>
             <p:nvPr/>
-          </p:nvSpPr>
-          <p:spPr>
+          </p:nvGrpSpPr>
+          <p:grpSpPr>
             <a:xfrm>
               <a:off x="0" y="0"/>
               <a:ext cx="3600450" cy="3600450"/>
+              <a:chOff x="0" y="0"/>
+              <a:chExt cx="3600450" cy="3600450"/>
             </a:xfrm>
-            <a:prstGeom prst="rect">
-              <a:avLst/>
-            </a:prstGeom>
-            <a:solidFill>
-              <a:schemeClr val="bg1"/>
-            </a:solidFill>
-            <a:ln>
+          </p:grpSpPr>
+          <p:sp>
+            <p:nvSpPr>
+              <p:cNvPr id="6" name="Rectangle 5">
+                <a:extLst>
+                  <a:ext uri="{FF2B5EF4-FFF2-40B4-BE49-F238E27FC236}">
+                    <a16:creationId xmlns:a16="http://schemas.microsoft.com/office/drawing/2014/main" id="{581538FD-95BC-BF43-AC64-D7F26A4660A2}"/>
+                  </a:ext>
+                </a:extLst>
+              </p:cNvPr>
+              <p:cNvSpPr/>
+              <p:nvPr/>
+            </p:nvSpPr>
+            <p:spPr>
+              <a:xfrm>
+                <a:off x="0" y="0"/>
+                <a:ext cx="3600450" cy="3600450"/>
+              </a:xfrm>
+              <a:prstGeom prst="rect">
+                <a:avLst/>
+              </a:prstGeom>
               <a:solidFill>
                 <a:schemeClr val="bg1"/>
               </a:solidFill>
-            </a:ln>
-          </p:spPr>
-          <p:style>
-            <a:lnRef idx="2">
-              <a:schemeClr val="accent1">
-                <a:shade val="50000"/>
-              </a:schemeClr>
-            </a:lnRef>
-            <a:fillRef idx="1">
-              <a:schemeClr val="accent1"/>
-            </a:fillRef>
-            <a:effectRef idx="0">
-              <a:schemeClr val="accent1"/>
-            </a:effectRef>
-            <a:fontRef idx="minor">
-              <a:schemeClr val="lt1"/>
-            </a:fontRef>
-          </p:style>
-          <p:txBody>
-            <a:bodyPr rtlCol="0" anchor="ctr"/>
-            <a:lstStyle/>
-            <a:p>
-              <a:pPr algn="ctr"/>
-              <a:endParaRPr lang="en-US"/>
-            </a:p>
-          </p:txBody>
-        </p:sp>
+              <a:ln>
+                <a:solidFill>
+                  <a:schemeClr val="bg1"/>
+                </a:solidFill>
+              </a:ln>
+            </p:spPr>
+            <p:style>
+              <a:lnRef idx="2">
+                <a:schemeClr val="accent1">
+                  <a:shade val="50000"/>
+                </a:schemeClr>
+              </a:lnRef>
+              <a:fillRef idx="1">
+                <a:schemeClr val="accent1"/>
+              </a:fillRef>
+              <a:effectRef idx="0">
+                <a:schemeClr val="accent1"/>
+              </a:effectRef>
+              <a:fontRef idx="minor">
+                <a:schemeClr val="lt1"/>
+              </a:fontRef>
+            </p:style>
+            <p:txBody>
+              <a:bodyPr rtlCol="0" anchor="ctr"/>
+              <a:lstStyle/>
+              <a:p>
+                <a:pPr algn="ctr"/>
+                <a:endParaRPr lang="en-US"/>
+              </a:p>
+            </p:txBody>
+          </p:sp>
+          <p:sp>
+            <p:nvSpPr>
+              <p:cNvPr id="22" name="Rectangle 21">
+                <a:extLst>
+                  <a:ext uri="{FF2B5EF4-FFF2-40B4-BE49-F238E27FC236}">
+                    <a16:creationId xmlns:a16="http://schemas.microsoft.com/office/drawing/2014/main" id="{829FE519-F166-7C42-A398-CED94FD0EDC3}"/>
+                  </a:ext>
+                </a:extLst>
+              </p:cNvPr>
+              <p:cNvSpPr/>
+              <p:nvPr/>
+            </p:nvSpPr>
+            <p:spPr>
+              <a:xfrm>
+                <a:off x="1042532" y="5824"/>
+                <a:ext cx="378574" cy="285386"/>
+              </a:xfrm>
+              <a:prstGeom prst="rect">
+                <a:avLst/>
+              </a:prstGeom>
+              <a:solidFill>
+                <a:schemeClr val="bg1"/>
+              </a:solidFill>
+              <a:ln>
+                <a:solidFill>
+                  <a:schemeClr val="bg1"/>
+                </a:solidFill>
+              </a:ln>
+            </p:spPr>
+            <p:style>
+              <a:lnRef idx="2">
+                <a:schemeClr val="accent1">
+                  <a:shade val="50000"/>
+                </a:schemeClr>
+              </a:lnRef>
+              <a:fillRef idx="1">
+                <a:schemeClr val="accent1"/>
+              </a:fillRef>
+              <a:effectRef idx="0">
+                <a:schemeClr val="accent1"/>
+              </a:effectRef>
+              <a:fontRef idx="minor">
+                <a:schemeClr val="lt1"/>
+              </a:fontRef>
+            </p:style>
+            <p:txBody>
+              <a:bodyPr rtlCol="0" anchor="ctr"/>
+              <a:lstStyle/>
+              <a:p>
+                <a:pPr algn="ctr"/>
+                <a:endParaRPr lang="en-US"/>
+              </a:p>
+            </p:txBody>
+          </p:sp>
+          <p:sp>
+            <p:nvSpPr>
+              <p:cNvPr id="23" name="Rectangle 22">
+                <a:extLst>
+                  <a:ext uri="{FF2B5EF4-FFF2-40B4-BE49-F238E27FC236}">
+                    <a16:creationId xmlns:a16="http://schemas.microsoft.com/office/drawing/2014/main" id="{DA9EAE4C-0957-B14F-BEDA-732B66BAA3AC}"/>
+                  </a:ext>
+                </a:extLst>
+              </p:cNvPr>
+              <p:cNvSpPr/>
+              <p:nvPr/>
+            </p:nvSpPr>
+            <p:spPr>
+              <a:xfrm>
+                <a:off x="1042532" y="3309240"/>
+                <a:ext cx="378574" cy="285386"/>
+              </a:xfrm>
+              <a:prstGeom prst="rect">
+                <a:avLst/>
+              </a:prstGeom>
+              <a:solidFill>
+                <a:schemeClr val="bg1"/>
+              </a:solidFill>
+              <a:ln>
+                <a:solidFill>
+                  <a:schemeClr val="bg1"/>
+                </a:solidFill>
+              </a:ln>
+            </p:spPr>
+            <p:style>
+              <a:lnRef idx="2">
+                <a:schemeClr val="accent1">
+                  <a:shade val="50000"/>
+                </a:schemeClr>
+              </a:lnRef>
+              <a:fillRef idx="1">
+                <a:schemeClr val="accent1"/>
+              </a:fillRef>
+              <a:effectRef idx="0">
+                <a:schemeClr val="accent1"/>
+              </a:effectRef>
+              <a:fontRef idx="minor">
+                <a:schemeClr val="lt1"/>
+              </a:fontRef>
+            </p:style>
+            <p:txBody>
+              <a:bodyPr rtlCol="0" anchor="ctr"/>
+              <a:lstStyle/>
+              <a:p>
+                <a:pPr algn="ctr"/>
+                <a:endParaRPr lang="en-US"/>
+              </a:p>
+            </p:txBody>
+          </p:sp>
+        </p:grpSp>
         <p:pic>
           <p:nvPicPr>
-            <p:cNvPr id="3" name="Picture 2">
+            <p:cNvPr id="41" name="Picture 40">
               <a:extLst>
                 <a:ext uri="{FF2B5EF4-FFF2-40B4-BE49-F238E27FC236}">
-                  <a16:creationId xmlns:a16="http://schemas.microsoft.com/office/drawing/2014/main" id="{191AFE56-ECF1-6944-BF24-2F0F665D53DD}"/>
+                  <a16:creationId xmlns:a16="http://schemas.microsoft.com/office/drawing/2014/main" id="{F5B03FA9-D0DB-664A-801E-D8F0C8308587}"/>
                 </a:ext>
               </a:extLst>
             </p:cNvPr>
@@ -3067,8 +3196,8 @@
           </p:blipFill>
           <p:spPr>
             <a:xfrm>
-              <a:off x="0" y="431633"/>
-              <a:ext cx="3600450" cy="2737184"/>
+              <a:off x="0" y="229985"/>
+              <a:ext cx="3600449" cy="3140480"/>
             </a:xfrm>
             <a:prstGeom prst="rect">
               <a:avLst/>

</xml_diff>

<commit_message>
Deploying to gh-pages from @ wengzf20/wengzf20.github.io@655c748448dc6345f4db409c039147693b614203 🚀
</commit_message>
<xml_diff>
--- a/assets/img/publication_preview/template.pptx
+++ b/assets/img/publication_preview/template.pptx
@@ -243,7 +243,7 @@
           <a:p>
             <a:fld id="{5AA09F1C-FA1A-5B4D-A72E-9DB711FD4947}" type="datetimeFigureOut">
               <a:rPr lang="en-US" smtClean="0"/>
-              <a:t>2/2/24</a:t>
+              <a:t>2/27/24</a:t>
             </a:fld>
             <a:endParaRPr lang="en-US"/>
           </a:p>
@@ -413,7 +413,7 @@
           <a:p>
             <a:fld id="{5AA09F1C-FA1A-5B4D-A72E-9DB711FD4947}" type="datetimeFigureOut">
               <a:rPr lang="en-US" smtClean="0"/>
-              <a:t>2/2/24</a:t>
+              <a:t>2/27/24</a:t>
             </a:fld>
             <a:endParaRPr lang="en-US"/>
           </a:p>
@@ -593,7 +593,7 @@
           <a:p>
             <a:fld id="{5AA09F1C-FA1A-5B4D-A72E-9DB711FD4947}" type="datetimeFigureOut">
               <a:rPr lang="en-US" smtClean="0"/>
-              <a:t>2/2/24</a:t>
+              <a:t>2/27/24</a:t>
             </a:fld>
             <a:endParaRPr lang="en-US"/>
           </a:p>
@@ -763,7 +763,7 @@
           <a:p>
             <a:fld id="{5AA09F1C-FA1A-5B4D-A72E-9DB711FD4947}" type="datetimeFigureOut">
               <a:rPr lang="en-US" smtClean="0"/>
-              <a:t>2/2/24</a:t>
+              <a:t>2/27/24</a:t>
             </a:fld>
             <a:endParaRPr lang="en-US"/>
           </a:p>
@@ -1007,7 +1007,7 @@
           <a:p>
             <a:fld id="{5AA09F1C-FA1A-5B4D-A72E-9DB711FD4947}" type="datetimeFigureOut">
               <a:rPr lang="en-US" smtClean="0"/>
-              <a:t>2/2/24</a:t>
+              <a:t>2/27/24</a:t>
             </a:fld>
             <a:endParaRPr lang="en-US"/>
           </a:p>
@@ -1239,7 +1239,7 @@
           <a:p>
             <a:fld id="{5AA09F1C-FA1A-5B4D-A72E-9DB711FD4947}" type="datetimeFigureOut">
               <a:rPr lang="en-US" smtClean="0"/>
-              <a:t>2/2/24</a:t>
+              <a:t>2/27/24</a:t>
             </a:fld>
             <a:endParaRPr lang="en-US"/>
           </a:p>
@@ -1606,7 +1606,7 @@
           <a:p>
             <a:fld id="{5AA09F1C-FA1A-5B4D-A72E-9DB711FD4947}" type="datetimeFigureOut">
               <a:rPr lang="en-US" smtClean="0"/>
-              <a:t>2/2/24</a:t>
+              <a:t>2/27/24</a:t>
             </a:fld>
             <a:endParaRPr lang="en-US"/>
           </a:p>
@@ -1724,7 +1724,7 @@
           <a:p>
             <a:fld id="{5AA09F1C-FA1A-5B4D-A72E-9DB711FD4947}" type="datetimeFigureOut">
               <a:rPr lang="en-US" smtClean="0"/>
-              <a:t>2/2/24</a:t>
+              <a:t>2/27/24</a:t>
             </a:fld>
             <a:endParaRPr lang="en-US"/>
           </a:p>
@@ -1819,7 +1819,7 @@
           <a:p>
             <a:fld id="{5AA09F1C-FA1A-5B4D-A72E-9DB711FD4947}" type="datetimeFigureOut">
               <a:rPr lang="en-US" smtClean="0"/>
-              <a:t>2/2/24</a:t>
+              <a:t>2/27/24</a:t>
             </a:fld>
             <a:endParaRPr lang="en-US"/>
           </a:p>
@@ -2096,7 +2096,7 @@
           <a:p>
             <a:fld id="{5AA09F1C-FA1A-5B4D-A72E-9DB711FD4947}" type="datetimeFigureOut">
               <a:rPr lang="en-US" smtClean="0"/>
-              <a:t>2/2/24</a:t>
+              <a:t>2/27/24</a:t>
             </a:fld>
             <a:endParaRPr lang="en-US"/>
           </a:p>
@@ -2353,7 +2353,7 @@
           <a:p>
             <a:fld id="{5AA09F1C-FA1A-5B4D-A72E-9DB711FD4947}" type="datetimeFigureOut">
               <a:rPr lang="en-US" smtClean="0"/>
-              <a:t>2/2/24</a:t>
+              <a:t>2/27/24</a:t>
             </a:fld>
             <a:endParaRPr lang="en-US"/>
           </a:p>
@@ -2566,7 +2566,7 @@
           <a:p>
             <a:fld id="{5AA09F1C-FA1A-5B4D-A72E-9DB711FD4947}" type="datetimeFigureOut">
               <a:rPr lang="en-US" smtClean="0"/>
-              <a:t>2/2/24</a:t>
+              <a:t>2/27/24</a:t>
             </a:fld>
             <a:endParaRPr lang="en-US"/>
           </a:p>
@@ -2973,10 +2973,10 @@
       </p:grpSpPr>
       <p:grpSp>
         <p:nvGrpSpPr>
-          <p:cNvPr id="42" name="Group 41">
+          <p:cNvPr id="4" name="Group 3">
             <a:extLst>
               <a:ext uri="{FF2B5EF4-FFF2-40B4-BE49-F238E27FC236}">
-                <a16:creationId xmlns:a16="http://schemas.microsoft.com/office/drawing/2014/main" id="{25DAFE6D-7421-5843-9483-B178C9982295}"/>
+                <a16:creationId xmlns:a16="http://schemas.microsoft.com/office/drawing/2014/main" id="{95C0BA41-6FEC-834A-A29B-60395FDFB4B1}"/>
               </a:ext>
             </a:extLst>
           </p:cNvPr>
@@ -3176,10 +3176,10 @@
         </p:grpSp>
         <p:pic>
           <p:nvPicPr>
-            <p:cNvPr id="41" name="Picture 40">
+            <p:cNvPr id="10" name="Picture 9">
               <a:extLst>
                 <a:ext uri="{FF2B5EF4-FFF2-40B4-BE49-F238E27FC236}">
-                  <a16:creationId xmlns:a16="http://schemas.microsoft.com/office/drawing/2014/main" id="{F5B03FA9-D0DB-664A-801E-D8F0C8308587}"/>
+                  <a16:creationId xmlns:a16="http://schemas.microsoft.com/office/drawing/2014/main" id="{CAF3D6C2-F785-9245-A018-B50CE9212D13}"/>
                 </a:ext>
               </a:extLst>
             </p:cNvPr>
@@ -3188,16 +3188,15 @@
             </p:cNvPicPr>
             <p:nvPr/>
           </p:nvPicPr>
-          <p:blipFill>
+          <p:blipFill rotWithShape="1">
             <a:blip r:embed="rId2"/>
-            <a:stretch>
-              <a:fillRect/>
-            </a:stretch>
+            <a:srcRect r="49329"/>
+            <a:stretch/>
           </p:blipFill>
           <p:spPr>
             <a:xfrm>
-              <a:off x="0" y="229985"/>
-              <a:ext cx="3600449" cy="3140480"/>
+              <a:off x="0" y="153663"/>
+              <a:ext cx="3600450" cy="3293124"/>
             </a:xfrm>
             <a:prstGeom prst="rect">
               <a:avLst/>

</xml_diff>

<commit_message>
Deploying to gh-pages from @ wengzf20/wengzf20.github.io@a87db5170970f34bfc9a5dbbfc816922ea517555 🚀
</commit_message>
<xml_diff>
--- a/assets/img/publication_preview/template.pptx
+++ b/assets/img/publication_preview/template.pptx
@@ -243,7 +243,7 @@
           <a:p>
             <a:fld id="{5AA09F1C-FA1A-5B4D-A72E-9DB711FD4947}" type="datetimeFigureOut">
               <a:rPr lang="en-US" smtClean="0"/>
-              <a:t>2/27/24</a:t>
+              <a:t>3/7/24</a:t>
             </a:fld>
             <a:endParaRPr lang="en-US"/>
           </a:p>
@@ -413,7 +413,7 @@
           <a:p>
             <a:fld id="{5AA09F1C-FA1A-5B4D-A72E-9DB711FD4947}" type="datetimeFigureOut">
               <a:rPr lang="en-US" smtClean="0"/>
-              <a:t>2/27/24</a:t>
+              <a:t>3/7/24</a:t>
             </a:fld>
             <a:endParaRPr lang="en-US"/>
           </a:p>
@@ -593,7 +593,7 @@
           <a:p>
             <a:fld id="{5AA09F1C-FA1A-5B4D-A72E-9DB711FD4947}" type="datetimeFigureOut">
               <a:rPr lang="en-US" smtClean="0"/>
-              <a:t>2/27/24</a:t>
+              <a:t>3/7/24</a:t>
             </a:fld>
             <a:endParaRPr lang="en-US"/>
           </a:p>
@@ -763,7 +763,7 @@
           <a:p>
             <a:fld id="{5AA09F1C-FA1A-5B4D-A72E-9DB711FD4947}" type="datetimeFigureOut">
               <a:rPr lang="en-US" smtClean="0"/>
-              <a:t>2/27/24</a:t>
+              <a:t>3/7/24</a:t>
             </a:fld>
             <a:endParaRPr lang="en-US"/>
           </a:p>
@@ -1007,7 +1007,7 @@
           <a:p>
             <a:fld id="{5AA09F1C-FA1A-5B4D-A72E-9DB711FD4947}" type="datetimeFigureOut">
               <a:rPr lang="en-US" smtClean="0"/>
-              <a:t>2/27/24</a:t>
+              <a:t>3/7/24</a:t>
             </a:fld>
             <a:endParaRPr lang="en-US"/>
           </a:p>
@@ -1239,7 +1239,7 @@
           <a:p>
             <a:fld id="{5AA09F1C-FA1A-5B4D-A72E-9DB711FD4947}" type="datetimeFigureOut">
               <a:rPr lang="en-US" smtClean="0"/>
-              <a:t>2/27/24</a:t>
+              <a:t>3/7/24</a:t>
             </a:fld>
             <a:endParaRPr lang="en-US"/>
           </a:p>
@@ -1606,7 +1606,7 @@
           <a:p>
             <a:fld id="{5AA09F1C-FA1A-5B4D-A72E-9DB711FD4947}" type="datetimeFigureOut">
               <a:rPr lang="en-US" smtClean="0"/>
-              <a:t>2/27/24</a:t>
+              <a:t>3/7/24</a:t>
             </a:fld>
             <a:endParaRPr lang="en-US"/>
           </a:p>
@@ -1724,7 +1724,7 @@
           <a:p>
             <a:fld id="{5AA09F1C-FA1A-5B4D-A72E-9DB711FD4947}" type="datetimeFigureOut">
               <a:rPr lang="en-US" smtClean="0"/>
-              <a:t>2/27/24</a:t>
+              <a:t>3/7/24</a:t>
             </a:fld>
             <a:endParaRPr lang="en-US"/>
           </a:p>
@@ -1819,7 +1819,7 @@
           <a:p>
             <a:fld id="{5AA09F1C-FA1A-5B4D-A72E-9DB711FD4947}" type="datetimeFigureOut">
               <a:rPr lang="en-US" smtClean="0"/>
-              <a:t>2/27/24</a:t>
+              <a:t>3/7/24</a:t>
             </a:fld>
             <a:endParaRPr lang="en-US"/>
           </a:p>
@@ -2096,7 +2096,7 @@
           <a:p>
             <a:fld id="{5AA09F1C-FA1A-5B4D-A72E-9DB711FD4947}" type="datetimeFigureOut">
               <a:rPr lang="en-US" smtClean="0"/>
-              <a:t>2/27/24</a:t>
+              <a:t>3/7/24</a:t>
             </a:fld>
             <a:endParaRPr lang="en-US"/>
           </a:p>
@@ -2353,7 +2353,7 @@
           <a:p>
             <a:fld id="{5AA09F1C-FA1A-5B4D-A72E-9DB711FD4947}" type="datetimeFigureOut">
               <a:rPr lang="en-US" smtClean="0"/>
-              <a:t>2/27/24</a:t>
+              <a:t>3/7/24</a:t>
             </a:fld>
             <a:endParaRPr lang="en-US"/>
           </a:p>
@@ -2566,7 +2566,7 @@
           <a:p>
             <a:fld id="{5AA09F1C-FA1A-5B4D-A72E-9DB711FD4947}" type="datetimeFigureOut">
               <a:rPr lang="en-US" smtClean="0"/>
-              <a:t>2/27/24</a:t>
+              <a:t>3/7/24</a:t>
             </a:fld>
             <a:endParaRPr lang="en-US"/>
           </a:p>
@@ -2973,10 +2973,10 @@
       </p:grpSpPr>
       <p:grpSp>
         <p:nvGrpSpPr>
-          <p:cNvPr id="4" name="Group 3">
+          <p:cNvPr id="5" name="Group 4">
             <a:extLst>
               <a:ext uri="{FF2B5EF4-FFF2-40B4-BE49-F238E27FC236}">
-                <a16:creationId xmlns:a16="http://schemas.microsoft.com/office/drawing/2014/main" id="{95C0BA41-6FEC-834A-A29B-60395FDFB4B1}"/>
+                <a16:creationId xmlns:a16="http://schemas.microsoft.com/office/drawing/2014/main" id="{9C24A688-DE3E-5D4A-8CC0-78F0CFFDF99F}"/>
               </a:ext>
             </a:extLst>
           </p:cNvPr>
@@ -3010,6 +3010,9 @@
               <a:chOff x="0" y="0"/>
               <a:chExt cx="3600450" cy="3600450"/>
             </a:xfrm>
+            <a:solidFill>
+              <a:schemeClr val="tx1"/>
+            </a:solidFill>
           </p:grpSpPr>
           <p:sp>
             <p:nvSpPr>
@@ -3031,66 +3034,10 @@
               <a:prstGeom prst="rect">
                 <a:avLst/>
               </a:prstGeom>
-              <a:solidFill>
-                <a:schemeClr val="bg1"/>
-              </a:solidFill>
+              <a:grpFill/>
               <a:ln>
                 <a:solidFill>
-                  <a:schemeClr val="bg1"/>
-                </a:solidFill>
-              </a:ln>
-            </p:spPr>
-            <p:style>
-              <a:lnRef idx="2">
-                <a:schemeClr val="accent1">
-                  <a:shade val="50000"/>
-                </a:schemeClr>
-              </a:lnRef>
-              <a:fillRef idx="1">
-                <a:schemeClr val="accent1"/>
-              </a:fillRef>
-              <a:effectRef idx="0">
-                <a:schemeClr val="accent1"/>
-              </a:effectRef>
-              <a:fontRef idx="minor">
-                <a:schemeClr val="lt1"/>
-              </a:fontRef>
-            </p:style>
-            <p:txBody>
-              <a:bodyPr rtlCol="0" anchor="ctr"/>
-              <a:lstStyle/>
-              <a:p>
-                <a:pPr algn="ctr"/>
-                <a:endParaRPr lang="en-US"/>
-              </a:p>
-            </p:txBody>
-          </p:sp>
-          <p:sp>
-            <p:nvSpPr>
-              <p:cNvPr id="22" name="Rectangle 21">
-                <a:extLst>
-                  <a:ext uri="{FF2B5EF4-FFF2-40B4-BE49-F238E27FC236}">
-                    <a16:creationId xmlns:a16="http://schemas.microsoft.com/office/drawing/2014/main" id="{829FE519-F166-7C42-A398-CED94FD0EDC3}"/>
-                  </a:ext>
-                </a:extLst>
-              </p:cNvPr>
-              <p:cNvSpPr/>
-              <p:nvPr/>
-            </p:nvSpPr>
-            <p:spPr>
-              <a:xfrm>
-                <a:off x="1042532" y="5824"/>
-                <a:ext cx="378574" cy="285386"/>
-              </a:xfrm>
-              <a:prstGeom prst="rect">
-                <a:avLst/>
-              </a:prstGeom>
-              <a:solidFill>
-                <a:schemeClr val="bg1"/>
-              </a:solidFill>
-              <a:ln>
-                <a:solidFill>
-                  <a:schemeClr val="bg1"/>
+                  <a:schemeClr val="tx1"/>
                 </a:solidFill>
               </a:ln>
             </p:spPr>
@@ -3139,12 +3086,10 @@
               <a:prstGeom prst="rect">
                 <a:avLst/>
               </a:prstGeom>
-              <a:solidFill>
-                <a:schemeClr val="bg1"/>
-              </a:solidFill>
+              <a:grpFill/>
               <a:ln>
                 <a:solidFill>
-                  <a:schemeClr val="bg1"/>
+                  <a:schemeClr val="tx1"/>
                 </a:solidFill>
               </a:ln>
             </p:spPr>
@@ -3176,10 +3121,10 @@
         </p:grpSp>
         <p:pic>
           <p:nvPicPr>
-            <p:cNvPr id="10" name="Picture 9">
+            <p:cNvPr id="3" name="Picture 2">
               <a:extLst>
                 <a:ext uri="{FF2B5EF4-FFF2-40B4-BE49-F238E27FC236}">
-                  <a16:creationId xmlns:a16="http://schemas.microsoft.com/office/drawing/2014/main" id="{CAF3D6C2-F785-9245-A018-B50CE9212D13}"/>
+                  <a16:creationId xmlns:a16="http://schemas.microsoft.com/office/drawing/2014/main" id="{009B5417-DE99-F34A-BA8D-1A0F0DB98673}"/>
                 </a:ext>
               </a:extLst>
             </p:cNvPr>
@@ -3190,13 +3135,13 @@
           </p:nvPicPr>
           <p:blipFill rotWithShape="1">
             <a:blip r:embed="rId2"/>
-            <a:srcRect r="49329"/>
+            <a:srcRect l="75404" t="1863" r="349" b="581"/>
             <a:stretch/>
           </p:blipFill>
           <p:spPr>
             <a:xfrm>
-              <a:off x="0" y="153663"/>
-              <a:ext cx="3600450" cy="3293124"/>
+              <a:off x="61708" y="67318"/>
+              <a:ext cx="3494915" cy="3527308"/>
             </a:xfrm>
             <a:prstGeom prst="rect">
               <a:avLst/>

</xml_diff>

<commit_message>
Deploying to gh-pages from @ wengzf20/wengzf20.github.io@c4bb424e4e6b32eeedcdef56d9ebdc1331b9bc61 🚀
</commit_message>
<xml_diff>
--- a/assets/img/publication_preview/template.pptx
+++ b/assets/img/publication_preview/template.pptx
@@ -243,7 +243,7 @@
           <a:p>
             <a:fld id="{5AA09F1C-FA1A-5B4D-A72E-9DB711FD4947}" type="datetimeFigureOut">
               <a:rPr lang="en-US" smtClean="0"/>
-              <a:t>3/7/24</a:t>
+              <a:t>3/20/24</a:t>
             </a:fld>
             <a:endParaRPr lang="en-US"/>
           </a:p>
@@ -413,7 +413,7 @@
           <a:p>
             <a:fld id="{5AA09F1C-FA1A-5B4D-A72E-9DB711FD4947}" type="datetimeFigureOut">
               <a:rPr lang="en-US" smtClean="0"/>
-              <a:t>3/7/24</a:t>
+              <a:t>3/20/24</a:t>
             </a:fld>
             <a:endParaRPr lang="en-US"/>
           </a:p>
@@ -593,7 +593,7 @@
           <a:p>
             <a:fld id="{5AA09F1C-FA1A-5B4D-A72E-9DB711FD4947}" type="datetimeFigureOut">
               <a:rPr lang="en-US" smtClean="0"/>
-              <a:t>3/7/24</a:t>
+              <a:t>3/20/24</a:t>
             </a:fld>
             <a:endParaRPr lang="en-US"/>
           </a:p>
@@ -763,7 +763,7 @@
           <a:p>
             <a:fld id="{5AA09F1C-FA1A-5B4D-A72E-9DB711FD4947}" type="datetimeFigureOut">
               <a:rPr lang="en-US" smtClean="0"/>
-              <a:t>3/7/24</a:t>
+              <a:t>3/20/24</a:t>
             </a:fld>
             <a:endParaRPr lang="en-US"/>
           </a:p>
@@ -1007,7 +1007,7 @@
           <a:p>
             <a:fld id="{5AA09F1C-FA1A-5B4D-A72E-9DB711FD4947}" type="datetimeFigureOut">
               <a:rPr lang="en-US" smtClean="0"/>
-              <a:t>3/7/24</a:t>
+              <a:t>3/20/24</a:t>
             </a:fld>
             <a:endParaRPr lang="en-US"/>
           </a:p>
@@ -1239,7 +1239,7 @@
           <a:p>
             <a:fld id="{5AA09F1C-FA1A-5B4D-A72E-9DB711FD4947}" type="datetimeFigureOut">
               <a:rPr lang="en-US" smtClean="0"/>
-              <a:t>3/7/24</a:t>
+              <a:t>3/20/24</a:t>
             </a:fld>
             <a:endParaRPr lang="en-US"/>
           </a:p>
@@ -1606,7 +1606,7 @@
           <a:p>
             <a:fld id="{5AA09F1C-FA1A-5B4D-A72E-9DB711FD4947}" type="datetimeFigureOut">
               <a:rPr lang="en-US" smtClean="0"/>
-              <a:t>3/7/24</a:t>
+              <a:t>3/20/24</a:t>
             </a:fld>
             <a:endParaRPr lang="en-US"/>
           </a:p>
@@ -1724,7 +1724,7 @@
           <a:p>
             <a:fld id="{5AA09F1C-FA1A-5B4D-A72E-9DB711FD4947}" type="datetimeFigureOut">
               <a:rPr lang="en-US" smtClean="0"/>
-              <a:t>3/7/24</a:t>
+              <a:t>3/20/24</a:t>
             </a:fld>
             <a:endParaRPr lang="en-US"/>
           </a:p>
@@ -1819,7 +1819,7 @@
           <a:p>
             <a:fld id="{5AA09F1C-FA1A-5B4D-A72E-9DB711FD4947}" type="datetimeFigureOut">
               <a:rPr lang="en-US" smtClean="0"/>
-              <a:t>3/7/24</a:t>
+              <a:t>3/20/24</a:t>
             </a:fld>
             <a:endParaRPr lang="en-US"/>
           </a:p>
@@ -2096,7 +2096,7 @@
           <a:p>
             <a:fld id="{5AA09F1C-FA1A-5B4D-A72E-9DB711FD4947}" type="datetimeFigureOut">
               <a:rPr lang="en-US" smtClean="0"/>
-              <a:t>3/7/24</a:t>
+              <a:t>3/20/24</a:t>
             </a:fld>
             <a:endParaRPr lang="en-US"/>
           </a:p>
@@ -2353,7 +2353,7 @@
           <a:p>
             <a:fld id="{5AA09F1C-FA1A-5B4D-A72E-9DB711FD4947}" type="datetimeFigureOut">
               <a:rPr lang="en-US" smtClean="0"/>
-              <a:t>3/7/24</a:t>
+              <a:t>3/20/24</a:t>
             </a:fld>
             <a:endParaRPr lang="en-US"/>
           </a:p>
@@ -2566,7 +2566,7 @@
           <a:p>
             <a:fld id="{5AA09F1C-FA1A-5B4D-A72E-9DB711FD4947}" type="datetimeFigureOut">
               <a:rPr lang="en-US" smtClean="0"/>
-              <a:t>3/7/24</a:t>
+              <a:t>3/20/24</a:t>
             </a:fld>
             <a:endParaRPr lang="en-US"/>
           </a:p>
@@ -2973,10 +2973,10 @@
       </p:grpSpPr>
       <p:grpSp>
         <p:nvGrpSpPr>
-          <p:cNvPr id="5" name="Group 4">
+          <p:cNvPr id="4" name="Group 3">
             <a:extLst>
               <a:ext uri="{FF2B5EF4-FFF2-40B4-BE49-F238E27FC236}">
-                <a16:creationId xmlns:a16="http://schemas.microsoft.com/office/drawing/2014/main" id="{9C24A688-DE3E-5D4A-8CC0-78F0CFFDF99F}"/>
+                <a16:creationId xmlns:a16="http://schemas.microsoft.com/office/drawing/2014/main" id="{9C558D73-75F2-E74F-A3EF-0BA8324234B7}"/>
               </a:ext>
             </a:extLst>
           </p:cNvPr>
@@ -2991,140 +2991,64 @@
             <a:chExt cx="3600450" cy="3600450"/>
           </a:xfrm>
         </p:grpSpPr>
-        <p:grpSp>
-          <p:nvGrpSpPr>
-            <p:cNvPr id="24" name="Group 23">
+        <p:sp>
+          <p:nvSpPr>
+            <p:cNvPr id="6" name="Rectangle 5">
               <a:extLst>
                 <a:ext uri="{FF2B5EF4-FFF2-40B4-BE49-F238E27FC236}">
-                  <a16:creationId xmlns:a16="http://schemas.microsoft.com/office/drawing/2014/main" id="{A17B2B4D-D256-2B44-A8A4-8B2724790003}"/>
+                  <a16:creationId xmlns:a16="http://schemas.microsoft.com/office/drawing/2014/main" id="{581538FD-95BC-BF43-AC64-D7F26A4660A2}"/>
                 </a:ext>
               </a:extLst>
             </p:cNvPr>
-            <p:cNvGrpSpPr/>
+            <p:cNvSpPr/>
             <p:nvPr/>
-          </p:nvGrpSpPr>
-          <p:grpSpPr>
+          </p:nvSpPr>
+          <p:spPr>
             <a:xfrm>
               <a:off x="0" y="0"/>
               <a:ext cx="3600450" cy="3600450"/>
-              <a:chOff x="0" y="0"/>
-              <a:chExt cx="3600450" cy="3600450"/>
             </a:xfrm>
+            <a:prstGeom prst="rect">
+              <a:avLst/>
+            </a:prstGeom>
             <a:solidFill>
-              <a:schemeClr val="tx1"/>
+              <a:schemeClr val="bg1"/>
             </a:solidFill>
-          </p:grpSpPr>
-          <p:sp>
-            <p:nvSpPr>
-              <p:cNvPr id="6" name="Rectangle 5">
-                <a:extLst>
-                  <a:ext uri="{FF2B5EF4-FFF2-40B4-BE49-F238E27FC236}">
-                    <a16:creationId xmlns:a16="http://schemas.microsoft.com/office/drawing/2014/main" id="{581538FD-95BC-BF43-AC64-D7F26A4660A2}"/>
-                  </a:ext>
-                </a:extLst>
-              </p:cNvPr>
-              <p:cNvSpPr/>
-              <p:nvPr/>
-            </p:nvSpPr>
-            <p:spPr>
-              <a:xfrm>
-                <a:off x="0" y="0"/>
-                <a:ext cx="3600450" cy="3600450"/>
-              </a:xfrm>
-              <a:prstGeom prst="rect">
-                <a:avLst/>
-              </a:prstGeom>
-              <a:grpFill/>
-              <a:ln>
-                <a:solidFill>
-                  <a:schemeClr val="tx1"/>
-                </a:solidFill>
-              </a:ln>
-            </p:spPr>
-            <p:style>
-              <a:lnRef idx="2">
-                <a:schemeClr val="accent1">
-                  <a:shade val="50000"/>
-                </a:schemeClr>
-              </a:lnRef>
-              <a:fillRef idx="1">
-                <a:schemeClr val="accent1"/>
-              </a:fillRef>
-              <a:effectRef idx="0">
-                <a:schemeClr val="accent1"/>
-              </a:effectRef>
-              <a:fontRef idx="minor">
-                <a:schemeClr val="lt1"/>
-              </a:fontRef>
-            </p:style>
-            <p:txBody>
-              <a:bodyPr rtlCol="0" anchor="ctr"/>
-              <a:lstStyle/>
-              <a:p>
-                <a:pPr algn="ctr"/>
-                <a:endParaRPr lang="en-US"/>
-              </a:p>
-            </p:txBody>
-          </p:sp>
-          <p:sp>
-            <p:nvSpPr>
-              <p:cNvPr id="23" name="Rectangle 22">
-                <a:extLst>
-                  <a:ext uri="{FF2B5EF4-FFF2-40B4-BE49-F238E27FC236}">
-                    <a16:creationId xmlns:a16="http://schemas.microsoft.com/office/drawing/2014/main" id="{DA9EAE4C-0957-B14F-BEDA-732B66BAA3AC}"/>
-                  </a:ext>
-                </a:extLst>
-              </p:cNvPr>
-              <p:cNvSpPr/>
-              <p:nvPr/>
-            </p:nvSpPr>
-            <p:spPr>
-              <a:xfrm>
-                <a:off x="1042532" y="3309240"/>
-                <a:ext cx="378574" cy="285386"/>
-              </a:xfrm>
-              <a:prstGeom prst="rect">
-                <a:avLst/>
-              </a:prstGeom>
-              <a:grpFill/>
-              <a:ln>
-                <a:solidFill>
-                  <a:schemeClr val="tx1"/>
-                </a:solidFill>
-              </a:ln>
-            </p:spPr>
-            <p:style>
-              <a:lnRef idx="2">
-                <a:schemeClr val="accent1">
-                  <a:shade val="50000"/>
-                </a:schemeClr>
-              </a:lnRef>
-              <a:fillRef idx="1">
-                <a:schemeClr val="accent1"/>
-              </a:fillRef>
-              <a:effectRef idx="0">
-                <a:schemeClr val="accent1"/>
-              </a:effectRef>
-              <a:fontRef idx="minor">
-                <a:schemeClr val="lt1"/>
-              </a:fontRef>
-            </p:style>
-            <p:txBody>
-              <a:bodyPr rtlCol="0" anchor="ctr"/>
-              <a:lstStyle/>
-              <a:p>
-                <a:pPr algn="ctr"/>
-                <a:endParaRPr lang="en-US"/>
-              </a:p>
-            </p:txBody>
-          </p:sp>
-        </p:grpSp>
+            <a:ln>
+              <a:noFill/>
+            </a:ln>
+          </p:spPr>
+          <p:style>
+            <a:lnRef idx="2">
+              <a:schemeClr val="accent1">
+                <a:shade val="50000"/>
+              </a:schemeClr>
+            </a:lnRef>
+            <a:fillRef idx="1">
+              <a:schemeClr val="accent1"/>
+            </a:fillRef>
+            <a:effectRef idx="0">
+              <a:schemeClr val="accent1"/>
+            </a:effectRef>
+            <a:fontRef idx="minor">
+              <a:schemeClr val="lt1"/>
+            </a:fontRef>
+          </p:style>
+          <p:txBody>
+            <a:bodyPr rtlCol="0" anchor="ctr"/>
+            <a:lstStyle/>
+            <a:p>
+              <a:pPr algn="ctr"/>
+              <a:endParaRPr lang="en-US" dirty="0"/>
+            </a:p>
+          </p:txBody>
+        </p:sp>
         <p:pic>
           <p:nvPicPr>
-            <p:cNvPr id="3" name="Picture 2">
+            <p:cNvPr id="2" name="Picture 1">
               <a:extLst>
                 <a:ext uri="{FF2B5EF4-FFF2-40B4-BE49-F238E27FC236}">
-                  <a16:creationId xmlns:a16="http://schemas.microsoft.com/office/drawing/2014/main" id="{009B5417-DE99-F34A-BA8D-1A0F0DB98673}"/>
+                  <a16:creationId xmlns:a16="http://schemas.microsoft.com/office/drawing/2014/main" id="{57C15BBB-301D-454E-A651-DD7C20EE0B27}"/>
                 </a:ext>
               </a:extLst>
             </p:cNvPr>
@@ -3133,15 +3057,16 @@
             </p:cNvPicPr>
             <p:nvPr/>
           </p:nvPicPr>
-          <p:blipFill rotWithShape="1">
+          <p:blipFill>
             <a:blip r:embed="rId2"/>
-            <a:srcRect l="75404" t="1863" r="349" b="581"/>
-            <a:stretch/>
+            <a:stretch>
+              <a:fillRect/>
+            </a:stretch>
           </p:blipFill>
           <p:spPr>
             <a:xfrm>
-              <a:off x="61708" y="67318"/>
-              <a:ext cx="3494915" cy="3527308"/>
+              <a:off x="0" y="376388"/>
+              <a:ext cx="3600450" cy="2847674"/>
             </a:xfrm>
             <a:prstGeom prst="rect">
               <a:avLst/>

</xml_diff>

<commit_message>
Deploying to gh-pages from @ wengzf20/wengzf20.github.io@b9b1a86b7ec5991dd8cb9997593781f209395d0f 🚀
</commit_message>
<xml_diff>
--- a/assets/img/publication_preview/template.pptx
+++ b/assets/img/publication_preview/template.pptx
@@ -243,7 +243,7 @@
           <a:p>
             <a:fld id="{5AA09F1C-FA1A-5B4D-A72E-9DB711FD4947}" type="datetimeFigureOut">
               <a:rPr lang="en-US" smtClean="0"/>
-              <a:t>3/20/24</a:t>
+              <a:t>5/12/24</a:t>
             </a:fld>
             <a:endParaRPr lang="en-US"/>
           </a:p>
@@ -413,7 +413,7 @@
           <a:p>
             <a:fld id="{5AA09F1C-FA1A-5B4D-A72E-9DB711FD4947}" type="datetimeFigureOut">
               <a:rPr lang="en-US" smtClean="0"/>
-              <a:t>3/20/24</a:t>
+              <a:t>5/12/24</a:t>
             </a:fld>
             <a:endParaRPr lang="en-US"/>
           </a:p>
@@ -593,7 +593,7 @@
           <a:p>
             <a:fld id="{5AA09F1C-FA1A-5B4D-A72E-9DB711FD4947}" type="datetimeFigureOut">
               <a:rPr lang="en-US" smtClean="0"/>
-              <a:t>3/20/24</a:t>
+              <a:t>5/12/24</a:t>
             </a:fld>
             <a:endParaRPr lang="en-US"/>
           </a:p>
@@ -763,7 +763,7 @@
           <a:p>
             <a:fld id="{5AA09F1C-FA1A-5B4D-A72E-9DB711FD4947}" type="datetimeFigureOut">
               <a:rPr lang="en-US" smtClean="0"/>
-              <a:t>3/20/24</a:t>
+              <a:t>5/12/24</a:t>
             </a:fld>
             <a:endParaRPr lang="en-US"/>
           </a:p>
@@ -1007,7 +1007,7 @@
           <a:p>
             <a:fld id="{5AA09F1C-FA1A-5B4D-A72E-9DB711FD4947}" type="datetimeFigureOut">
               <a:rPr lang="en-US" smtClean="0"/>
-              <a:t>3/20/24</a:t>
+              <a:t>5/12/24</a:t>
             </a:fld>
             <a:endParaRPr lang="en-US"/>
           </a:p>
@@ -1239,7 +1239,7 @@
           <a:p>
             <a:fld id="{5AA09F1C-FA1A-5B4D-A72E-9DB711FD4947}" type="datetimeFigureOut">
               <a:rPr lang="en-US" smtClean="0"/>
-              <a:t>3/20/24</a:t>
+              <a:t>5/12/24</a:t>
             </a:fld>
             <a:endParaRPr lang="en-US"/>
           </a:p>
@@ -1606,7 +1606,7 @@
           <a:p>
             <a:fld id="{5AA09F1C-FA1A-5B4D-A72E-9DB711FD4947}" type="datetimeFigureOut">
               <a:rPr lang="en-US" smtClean="0"/>
-              <a:t>3/20/24</a:t>
+              <a:t>5/12/24</a:t>
             </a:fld>
             <a:endParaRPr lang="en-US"/>
           </a:p>
@@ -1724,7 +1724,7 @@
           <a:p>
             <a:fld id="{5AA09F1C-FA1A-5B4D-A72E-9DB711FD4947}" type="datetimeFigureOut">
               <a:rPr lang="en-US" smtClean="0"/>
-              <a:t>3/20/24</a:t>
+              <a:t>5/12/24</a:t>
             </a:fld>
             <a:endParaRPr lang="en-US"/>
           </a:p>
@@ -1819,7 +1819,7 @@
           <a:p>
             <a:fld id="{5AA09F1C-FA1A-5B4D-A72E-9DB711FD4947}" type="datetimeFigureOut">
               <a:rPr lang="en-US" smtClean="0"/>
-              <a:t>3/20/24</a:t>
+              <a:t>5/12/24</a:t>
             </a:fld>
             <a:endParaRPr lang="en-US"/>
           </a:p>
@@ -2096,7 +2096,7 @@
           <a:p>
             <a:fld id="{5AA09F1C-FA1A-5B4D-A72E-9DB711FD4947}" type="datetimeFigureOut">
               <a:rPr lang="en-US" smtClean="0"/>
-              <a:t>3/20/24</a:t>
+              <a:t>5/12/24</a:t>
             </a:fld>
             <a:endParaRPr lang="en-US"/>
           </a:p>
@@ -2353,7 +2353,7 @@
           <a:p>
             <a:fld id="{5AA09F1C-FA1A-5B4D-A72E-9DB711FD4947}" type="datetimeFigureOut">
               <a:rPr lang="en-US" smtClean="0"/>
-              <a:t>3/20/24</a:t>
+              <a:t>5/12/24</a:t>
             </a:fld>
             <a:endParaRPr lang="en-US"/>
           </a:p>
@@ -2566,7 +2566,7 @@
           <a:p>
             <a:fld id="{5AA09F1C-FA1A-5B4D-A72E-9DB711FD4947}" type="datetimeFigureOut">
               <a:rPr lang="en-US" smtClean="0"/>
-              <a:t>3/20/24</a:t>
+              <a:t>5/12/24</a:t>
             </a:fld>
             <a:endParaRPr lang="en-US"/>
           </a:p>
@@ -2973,10 +2973,10 @@
       </p:grpSpPr>
       <p:grpSp>
         <p:nvGrpSpPr>
-          <p:cNvPr id="4" name="Group 3">
+          <p:cNvPr id="7" name="Group 6">
             <a:extLst>
               <a:ext uri="{FF2B5EF4-FFF2-40B4-BE49-F238E27FC236}">
-                <a16:creationId xmlns:a16="http://schemas.microsoft.com/office/drawing/2014/main" id="{9C558D73-75F2-E74F-A3EF-0BA8324234B7}"/>
+                <a16:creationId xmlns:a16="http://schemas.microsoft.com/office/drawing/2014/main" id="{BD3BC40F-61B5-564E-A884-4529A6AC2D91}"/>
               </a:ext>
             </a:extLst>
           </p:cNvPr>
@@ -3045,10 +3045,10 @@
         </p:sp>
         <p:pic>
           <p:nvPicPr>
-            <p:cNvPr id="2" name="Picture 1">
+            <p:cNvPr id="5" name="Picture 4">
               <a:extLst>
                 <a:ext uri="{FF2B5EF4-FFF2-40B4-BE49-F238E27FC236}">
-                  <a16:creationId xmlns:a16="http://schemas.microsoft.com/office/drawing/2014/main" id="{57C15BBB-301D-454E-A651-DD7C20EE0B27}"/>
+                  <a16:creationId xmlns:a16="http://schemas.microsoft.com/office/drawing/2014/main" id="{D9CD6725-A30D-9F4C-8EDA-A393C5C4A6AF}"/>
                 </a:ext>
               </a:extLst>
             </p:cNvPr>
@@ -3065,8 +3065,8 @@
           </p:blipFill>
           <p:spPr>
             <a:xfrm>
-              <a:off x="0" y="376388"/>
-              <a:ext cx="3600450" cy="2847674"/>
+              <a:off x="0" y="274349"/>
+              <a:ext cx="3600450" cy="3051751"/>
             </a:xfrm>
             <a:prstGeom prst="rect">
               <a:avLst/>

</xml_diff>

<commit_message>
Deploying to gh-pages from @ wengzf20/wengzf20.github.io@29dc33a52378fe41ff954f25f1dee3984615602d 🚀
</commit_message>
<xml_diff>
--- a/assets/img/publication_preview/template.pptx
+++ b/assets/img/publication_preview/template.pptx
@@ -243,7 +243,7 @@
           <a:p>
             <a:fld id="{5AA09F1C-FA1A-5B4D-A72E-9DB711FD4947}" type="datetimeFigureOut">
               <a:rPr lang="en-US" smtClean="0"/>
-              <a:t>5/12/24</a:t>
+              <a:t>6/17/24</a:t>
             </a:fld>
             <a:endParaRPr lang="en-US"/>
           </a:p>
@@ -413,7 +413,7 @@
           <a:p>
             <a:fld id="{5AA09F1C-FA1A-5B4D-A72E-9DB711FD4947}" type="datetimeFigureOut">
               <a:rPr lang="en-US" smtClean="0"/>
-              <a:t>5/12/24</a:t>
+              <a:t>6/17/24</a:t>
             </a:fld>
             <a:endParaRPr lang="en-US"/>
           </a:p>
@@ -593,7 +593,7 @@
           <a:p>
             <a:fld id="{5AA09F1C-FA1A-5B4D-A72E-9DB711FD4947}" type="datetimeFigureOut">
               <a:rPr lang="en-US" smtClean="0"/>
-              <a:t>5/12/24</a:t>
+              <a:t>6/17/24</a:t>
             </a:fld>
             <a:endParaRPr lang="en-US"/>
           </a:p>
@@ -763,7 +763,7 @@
           <a:p>
             <a:fld id="{5AA09F1C-FA1A-5B4D-A72E-9DB711FD4947}" type="datetimeFigureOut">
               <a:rPr lang="en-US" smtClean="0"/>
-              <a:t>5/12/24</a:t>
+              <a:t>6/17/24</a:t>
             </a:fld>
             <a:endParaRPr lang="en-US"/>
           </a:p>
@@ -1007,7 +1007,7 @@
           <a:p>
             <a:fld id="{5AA09F1C-FA1A-5B4D-A72E-9DB711FD4947}" type="datetimeFigureOut">
               <a:rPr lang="en-US" smtClean="0"/>
-              <a:t>5/12/24</a:t>
+              <a:t>6/17/24</a:t>
             </a:fld>
             <a:endParaRPr lang="en-US"/>
           </a:p>
@@ -1239,7 +1239,7 @@
           <a:p>
             <a:fld id="{5AA09F1C-FA1A-5B4D-A72E-9DB711FD4947}" type="datetimeFigureOut">
               <a:rPr lang="en-US" smtClean="0"/>
-              <a:t>5/12/24</a:t>
+              <a:t>6/17/24</a:t>
             </a:fld>
             <a:endParaRPr lang="en-US"/>
           </a:p>
@@ -1606,7 +1606,7 @@
           <a:p>
             <a:fld id="{5AA09F1C-FA1A-5B4D-A72E-9DB711FD4947}" type="datetimeFigureOut">
               <a:rPr lang="en-US" smtClean="0"/>
-              <a:t>5/12/24</a:t>
+              <a:t>6/17/24</a:t>
             </a:fld>
             <a:endParaRPr lang="en-US"/>
           </a:p>
@@ -1724,7 +1724,7 @@
           <a:p>
             <a:fld id="{5AA09F1C-FA1A-5B4D-A72E-9DB711FD4947}" type="datetimeFigureOut">
               <a:rPr lang="en-US" smtClean="0"/>
-              <a:t>5/12/24</a:t>
+              <a:t>6/17/24</a:t>
             </a:fld>
             <a:endParaRPr lang="en-US"/>
           </a:p>
@@ -1819,7 +1819,7 @@
           <a:p>
             <a:fld id="{5AA09F1C-FA1A-5B4D-A72E-9DB711FD4947}" type="datetimeFigureOut">
               <a:rPr lang="en-US" smtClean="0"/>
-              <a:t>5/12/24</a:t>
+              <a:t>6/17/24</a:t>
             </a:fld>
             <a:endParaRPr lang="en-US"/>
           </a:p>
@@ -2096,7 +2096,7 @@
           <a:p>
             <a:fld id="{5AA09F1C-FA1A-5B4D-A72E-9DB711FD4947}" type="datetimeFigureOut">
               <a:rPr lang="en-US" smtClean="0"/>
-              <a:t>5/12/24</a:t>
+              <a:t>6/17/24</a:t>
             </a:fld>
             <a:endParaRPr lang="en-US"/>
           </a:p>
@@ -2353,7 +2353,7 @@
           <a:p>
             <a:fld id="{5AA09F1C-FA1A-5B4D-A72E-9DB711FD4947}" type="datetimeFigureOut">
               <a:rPr lang="en-US" smtClean="0"/>
-              <a:t>5/12/24</a:t>
+              <a:t>6/17/24</a:t>
             </a:fld>
             <a:endParaRPr lang="en-US"/>
           </a:p>
@@ -2566,7 +2566,7 @@
           <a:p>
             <a:fld id="{5AA09F1C-FA1A-5B4D-A72E-9DB711FD4947}" type="datetimeFigureOut">
               <a:rPr lang="en-US" smtClean="0"/>
-              <a:t>5/12/24</a:t>
+              <a:t>6/17/24</a:t>
             </a:fld>
             <a:endParaRPr lang="en-US"/>
           </a:p>
@@ -2971,109 +2971,36 @@
           <a:chExt cx="0" cy="0"/>
         </a:xfrm>
       </p:grpSpPr>
-      <p:grpSp>
-        <p:nvGrpSpPr>
-          <p:cNvPr id="7" name="Group 6">
+      <p:pic>
+        <p:nvPicPr>
+          <p:cNvPr id="3" name="Picture 2">
             <a:extLst>
               <a:ext uri="{FF2B5EF4-FFF2-40B4-BE49-F238E27FC236}">
-                <a16:creationId xmlns:a16="http://schemas.microsoft.com/office/drawing/2014/main" id="{BD3BC40F-61B5-564E-A884-4529A6AC2D91}"/>
+                <a16:creationId xmlns:a16="http://schemas.microsoft.com/office/drawing/2014/main" id="{A4EB7750-2457-3E46-82A0-21554A120424}"/>
               </a:ext>
             </a:extLst>
           </p:cNvPr>
-          <p:cNvGrpSpPr/>
+          <p:cNvPicPr>
+            <a:picLocks noChangeAspect="1"/>
+          </p:cNvPicPr>
           <p:nvPr/>
-        </p:nvGrpSpPr>
-        <p:grpSpPr>
+        </p:nvPicPr>
+        <p:blipFill>
+          <a:blip r:embed="rId2"/>
+          <a:stretch>
+            <a:fillRect/>
+          </a:stretch>
+        </p:blipFill>
+        <p:spPr>
           <a:xfrm>
-            <a:off x="0" y="0"/>
-            <a:ext cx="3600450" cy="3600450"/>
-            <a:chOff x="0" y="0"/>
-            <a:chExt cx="3600450" cy="3600450"/>
+            <a:off x="0" y="361313"/>
+            <a:ext cx="3600450" cy="2877824"/>
           </a:xfrm>
-        </p:grpSpPr>
-        <p:sp>
-          <p:nvSpPr>
-            <p:cNvPr id="6" name="Rectangle 5">
-              <a:extLst>
-                <a:ext uri="{FF2B5EF4-FFF2-40B4-BE49-F238E27FC236}">
-                  <a16:creationId xmlns:a16="http://schemas.microsoft.com/office/drawing/2014/main" id="{581538FD-95BC-BF43-AC64-D7F26A4660A2}"/>
-                </a:ext>
-              </a:extLst>
-            </p:cNvPr>
-            <p:cNvSpPr/>
-            <p:nvPr/>
-          </p:nvSpPr>
-          <p:spPr>
-            <a:xfrm>
-              <a:off x="0" y="0"/>
-              <a:ext cx="3600450" cy="3600450"/>
-            </a:xfrm>
-            <a:prstGeom prst="rect">
-              <a:avLst/>
-            </a:prstGeom>
-            <a:solidFill>
-              <a:schemeClr val="bg1"/>
-            </a:solidFill>
-            <a:ln>
-              <a:noFill/>
-            </a:ln>
-          </p:spPr>
-          <p:style>
-            <a:lnRef idx="2">
-              <a:schemeClr val="accent1">
-                <a:shade val="50000"/>
-              </a:schemeClr>
-            </a:lnRef>
-            <a:fillRef idx="1">
-              <a:schemeClr val="accent1"/>
-            </a:fillRef>
-            <a:effectRef idx="0">
-              <a:schemeClr val="accent1"/>
-            </a:effectRef>
-            <a:fontRef idx="minor">
-              <a:schemeClr val="lt1"/>
-            </a:fontRef>
-          </p:style>
-          <p:txBody>
-            <a:bodyPr rtlCol="0" anchor="ctr"/>
-            <a:lstStyle/>
-            <a:p>
-              <a:pPr algn="ctr"/>
-              <a:endParaRPr lang="en-US" dirty="0"/>
-            </a:p>
-          </p:txBody>
-        </p:sp>
-        <p:pic>
-          <p:nvPicPr>
-            <p:cNvPr id="5" name="Picture 4">
-              <a:extLst>
-                <a:ext uri="{FF2B5EF4-FFF2-40B4-BE49-F238E27FC236}">
-                  <a16:creationId xmlns:a16="http://schemas.microsoft.com/office/drawing/2014/main" id="{D9CD6725-A30D-9F4C-8EDA-A393C5C4A6AF}"/>
-                </a:ext>
-              </a:extLst>
-            </p:cNvPr>
-            <p:cNvPicPr>
-              <a:picLocks noChangeAspect="1"/>
-            </p:cNvPicPr>
-            <p:nvPr/>
-          </p:nvPicPr>
-          <p:blipFill>
-            <a:blip r:embed="rId2"/>
-            <a:stretch>
-              <a:fillRect/>
-            </a:stretch>
-          </p:blipFill>
-          <p:spPr>
-            <a:xfrm>
-              <a:off x="0" y="274349"/>
-              <a:ext cx="3600450" cy="3051751"/>
-            </a:xfrm>
-            <a:prstGeom prst="rect">
-              <a:avLst/>
-            </a:prstGeom>
-          </p:spPr>
-        </p:pic>
-      </p:grpSp>
+          <a:prstGeom prst="rect">
+            <a:avLst/>
+          </a:prstGeom>
+        </p:spPr>
+      </p:pic>
     </p:spTree>
     <p:extLst>
       <p:ext uri="{BB962C8B-B14F-4D97-AF65-F5344CB8AC3E}">

</xml_diff>

<commit_message>
Deploying to gh-pages from @ wengzf20/wengzf20.github.io@7be2d2f926216bfe6d389de04f27a683f62d81f7 🚀
</commit_message>
<xml_diff>
--- a/assets/img/publication_preview/template.pptx
+++ b/assets/img/publication_preview/template.pptx
@@ -243,7 +243,7 @@
           <a:p>
             <a:fld id="{5AA09F1C-FA1A-5B4D-A72E-9DB711FD4947}" type="datetimeFigureOut">
               <a:rPr lang="en-US" smtClean="0"/>
-              <a:t>6/17/24</a:t>
+              <a:t>7/18/24</a:t>
             </a:fld>
             <a:endParaRPr lang="en-US"/>
           </a:p>
@@ -413,7 +413,7 @@
           <a:p>
             <a:fld id="{5AA09F1C-FA1A-5B4D-A72E-9DB711FD4947}" type="datetimeFigureOut">
               <a:rPr lang="en-US" smtClean="0"/>
-              <a:t>6/17/24</a:t>
+              <a:t>7/18/24</a:t>
             </a:fld>
             <a:endParaRPr lang="en-US"/>
           </a:p>
@@ -593,7 +593,7 @@
           <a:p>
             <a:fld id="{5AA09F1C-FA1A-5B4D-A72E-9DB711FD4947}" type="datetimeFigureOut">
               <a:rPr lang="en-US" smtClean="0"/>
-              <a:t>6/17/24</a:t>
+              <a:t>7/18/24</a:t>
             </a:fld>
             <a:endParaRPr lang="en-US"/>
           </a:p>
@@ -763,7 +763,7 @@
           <a:p>
             <a:fld id="{5AA09F1C-FA1A-5B4D-A72E-9DB711FD4947}" type="datetimeFigureOut">
               <a:rPr lang="en-US" smtClean="0"/>
-              <a:t>6/17/24</a:t>
+              <a:t>7/18/24</a:t>
             </a:fld>
             <a:endParaRPr lang="en-US"/>
           </a:p>
@@ -1007,7 +1007,7 @@
           <a:p>
             <a:fld id="{5AA09F1C-FA1A-5B4D-A72E-9DB711FD4947}" type="datetimeFigureOut">
               <a:rPr lang="en-US" smtClean="0"/>
-              <a:t>6/17/24</a:t>
+              <a:t>7/18/24</a:t>
             </a:fld>
             <a:endParaRPr lang="en-US"/>
           </a:p>
@@ -1239,7 +1239,7 @@
           <a:p>
             <a:fld id="{5AA09F1C-FA1A-5B4D-A72E-9DB711FD4947}" type="datetimeFigureOut">
               <a:rPr lang="en-US" smtClean="0"/>
-              <a:t>6/17/24</a:t>
+              <a:t>7/18/24</a:t>
             </a:fld>
             <a:endParaRPr lang="en-US"/>
           </a:p>
@@ -1606,7 +1606,7 @@
           <a:p>
             <a:fld id="{5AA09F1C-FA1A-5B4D-A72E-9DB711FD4947}" type="datetimeFigureOut">
               <a:rPr lang="en-US" smtClean="0"/>
-              <a:t>6/17/24</a:t>
+              <a:t>7/18/24</a:t>
             </a:fld>
             <a:endParaRPr lang="en-US"/>
           </a:p>
@@ -1724,7 +1724,7 @@
           <a:p>
             <a:fld id="{5AA09F1C-FA1A-5B4D-A72E-9DB711FD4947}" type="datetimeFigureOut">
               <a:rPr lang="en-US" smtClean="0"/>
-              <a:t>6/17/24</a:t>
+              <a:t>7/18/24</a:t>
             </a:fld>
             <a:endParaRPr lang="en-US"/>
           </a:p>
@@ -1819,7 +1819,7 @@
           <a:p>
             <a:fld id="{5AA09F1C-FA1A-5B4D-A72E-9DB711FD4947}" type="datetimeFigureOut">
               <a:rPr lang="en-US" smtClean="0"/>
-              <a:t>6/17/24</a:t>
+              <a:t>7/18/24</a:t>
             </a:fld>
             <a:endParaRPr lang="en-US"/>
           </a:p>
@@ -2096,7 +2096,7 @@
           <a:p>
             <a:fld id="{5AA09F1C-FA1A-5B4D-A72E-9DB711FD4947}" type="datetimeFigureOut">
               <a:rPr lang="en-US" smtClean="0"/>
-              <a:t>6/17/24</a:t>
+              <a:t>7/18/24</a:t>
             </a:fld>
             <a:endParaRPr lang="en-US"/>
           </a:p>
@@ -2353,7 +2353,7 @@
           <a:p>
             <a:fld id="{5AA09F1C-FA1A-5B4D-A72E-9DB711FD4947}" type="datetimeFigureOut">
               <a:rPr lang="en-US" smtClean="0"/>
-              <a:t>6/17/24</a:t>
+              <a:t>7/18/24</a:t>
             </a:fld>
             <a:endParaRPr lang="en-US"/>
           </a:p>
@@ -2566,7 +2566,7 @@
           <a:p>
             <a:fld id="{5AA09F1C-FA1A-5B4D-A72E-9DB711FD4947}" type="datetimeFigureOut">
               <a:rPr lang="en-US" smtClean="0"/>
-              <a:t>6/17/24</a:t>
+              <a:t>7/18/24</a:t>
             </a:fld>
             <a:endParaRPr lang="en-US"/>
           </a:p>
@@ -2973,10 +2973,10 @@
       </p:grpSpPr>
       <p:pic>
         <p:nvPicPr>
-          <p:cNvPr id="3" name="Picture 2">
+          <p:cNvPr id="4" name="Picture 3">
             <a:extLst>
               <a:ext uri="{FF2B5EF4-FFF2-40B4-BE49-F238E27FC236}">
-                <a16:creationId xmlns:a16="http://schemas.microsoft.com/office/drawing/2014/main" id="{A4EB7750-2457-3E46-82A0-21554A120424}"/>
+                <a16:creationId xmlns:a16="http://schemas.microsoft.com/office/drawing/2014/main" id="{07570CED-08CB-204A-BA7C-0B0A62987619}"/>
               </a:ext>
             </a:extLst>
           </p:cNvPr>
@@ -2993,8 +2993,8 @@
         </p:blipFill>
         <p:spPr>
           <a:xfrm>
-            <a:off x="0" y="361313"/>
-            <a:ext cx="3600450" cy="2877824"/>
+            <a:off x="0" y="541000"/>
+            <a:ext cx="3600450" cy="2518449"/>
           </a:xfrm>
           <a:prstGeom prst="rect">
             <a:avLst/>

</xml_diff>

<commit_message>
Deploying to gh-pages from @ wengzf20/wengzf20.github.io@d54a6cfd890b5fa1408a3608da617533bf318b8f 🚀
</commit_message>
<xml_diff>
--- a/assets/img/publication_preview/template.pptx
+++ b/assets/img/publication_preview/template.pptx
@@ -243,7 +243,7 @@
           <a:p>
             <a:fld id="{5AA09F1C-FA1A-5B4D-A72E-9DB711FD4947}" type="datetimeFigureOut">
               <a:rPr lang="en-US" smtClean="0"/>
-              <a:t>7/18/24</a:t>
+              <a:t>9/23/24</a:t>
             </a:fld>
             <a:endParaRPr lang="en-US"/>
           </a:p>
@@ -413,7 +413,7 @@
           <a:p>
             <a:fld id="{5AA09F1C-FA1A-5B4D-A72E-9DB711FD4947}" type="datetimeFigureOut">
               <a:rPr lang="en-US" smtClean="0"/>
-              <a:t>7/18/24</a:t>
+              <a:t>9/23/24</a:t>
             </a:fld>
             <a:endParaRPr lang="en-US"/>
           </a:p>
@@ -593,7 +593,7 @@
           <a:p>
             <a:fld id="{5AA09F1C-FA1A-5B4D-A72E-9DB711FD4947}" type="datetimeFigureOut">
               <a:rPr lang="en-US" smtClean="0"/>
-              <a:t>7/18/24</a:t>
+              <a:t>9/23/24</a:t>
             </a:fld>
             <a:endParaRPr lang="en-US"/>
           </a:p>
@@ -763,7 +763,7 @@
           <a:p>
             <a:fld id="{5AA09F1C-FA1A-5B4D-A72E-9DB711FD4947}" type="datetimeFigureOut">
               <a:rPr lang="en-US" smtClean="0"/>
-              <a:t>7/18/24</a:t>
+              <a:t>9/23/24</a:t>
             </a:fld>
             <a:endParaRPr lang="en-US"/>
           </a:p>
@@ -1007,7 +1007,7 @@
           <a:p>
             <a:fld id="{5AA09F1C-FA1A-5B4D-A72E-9DB711FD4947}" type="datetimeFigureOut">
               <a:rPr lang="en-US" smtClean="0"/>
-              <a:t>7/18/24</a:t>
+              <a:t>9/23/24</a:t>
             </a:fld>
             <a:endParaRPr lang="en-US"/>
           </a:p>
@@ -1239,7 +1239,7 @@
           <a:p>
             <a:fld id="{5AA09F1C-FA1A-5B4D-A72E-9DB711FD4947}" type="datetimeFigureOut">
               <a:rPr lang="en-US" smtClean="0"/>
-              <a:t>7/18/24</a:t>
+              <a:t>9/23/24</a:t>
             </a:fld>
             <a:endParaRPr lang="en-US"/>
           </a:p>
@@ -1606,7 +1606,7 @@
           <a:p>
             <a:fld id="{5AA09F1C-FA1A-5B4D-A72E-9DB711FD4947}" type="datetimeFigureOut">
               <a:rPr lang="en-US" smtClean="0"/>
-              <a:t>7/18/24</a:t>
+              <a:t>9/23/24</a:t>
             </a:fld>
             <a:endParaRPr lang="en-US"/>
           </a:p>
@@ -1724,7 +1724,7 @@
           <a:p>
             <a:fld id="{5AA09F1C-FA1A-5B4D-A72E-9DB711FD4947}" type="datetimeFigureOut">
               <a:rPr lang="en-US" smtClean="0"/>
-              <a:t>7/18/24</a:t>
+              <a:t>9/23/24</a:t>
             </a:fld>
             <a:endParaRPr lang="en-US"/>
           </a:p>
@@ -1819,7 +1819,7 @@
           <a:p>
             <a:fld id="{5AA09F1C-FA1A-5B4D-A72E-9DB711FD4947}" type="datetimeFigureOut">
               <a:rPr lang="en-US" smtClean="0"/>
-              <a:t>7/18/24</a:t>
+              <a:t>9/23/24</a:t>
             </a:fld>
             <a:endParaRPr lang="en-US"/>
           </a:p>
@@ -2096,7 +2096,7 @@
           <a:p>
             <a:fld id="{5AA09F1C-FA1A-5B4D-A72E-9DB711FD4947}" type="datetimeFigureOut">
               <a:rPr lang="en-US" smtClean="0"/>
-              <a:t>7/18/24</a:t>
+              <a:t>9/23/24</a:t>
             </a:fld>
             <a:endParaRPr lang="en-US"/>
           </a:p>
@@ -2353,7 +2353,7 @@
           <a:p>
             <a:fld id="{5AA09F1C-FA1A-5B4D-A72E-9DB711FD4947}" type="datetimeFigureOut">
               <a:rPr lang="en-US" smtClean="0"/>
-              <a:t>7/18/24</a:t>
+              <a:t>9/23/24</a:t>
             </a:fld>
             <a:endParaRPr lang="en-US"/>
           </a:p>
@@ -2566,7 +2566,7 @@
           <a:p>
             <a:fld id="{5AA09F1C-FA1A-5B4D-A72E-9DB711FD4947}" type="datetimeFigureOut">
               <a:rPr lang="en-US" smtClean="0"/>
-              <a:t>7/18/24</a:t>
+              <a:t>9/23/24</a:t>
             </a:fld>
             <a:endParaRPr lang="en-US"/>
           </a:p>
@@ -2973,10 +2973,10 @@
       </p:grpSpPr>
       <p:pic>
         <p:nvPicPr>
-          <p:cNvPr id="4" name="Picture 3">
+          <p:cNvPr id="3" name="Picture 2">
             <a:extLst>
               <a:ext uri="{FF2B5EF4-FFF2-40B4-BE49-F238E27FC236}">
-                <a16:creationId xmlns:a16="http://schemas.microsoft.com/office/drawing/2014/main" id="{07570CED-08CB-204A-BA7C-0B0A62987619}"/>
+                <a16:creationId xmlns:a16="http://schemas.microsoft.com/office/drawing/2014/main" id="{7A146F9B-B864-3643-B842-E7CEBB229FA8}"/>
               </a:ext>
             </a:extLst>
           </p:cNvPr>
@@ -2985,16 +2985,15 @@
           </p:cNvPicPr>
           <p:nvPr/>
         </p:nvPicPr>
-        <p:blipFill>
+        <p:blipFill rotWithShape="1">
           <a:blip r:embed="rId2"/>
-          <a:stretch>
-            <a:fillRect/>
-          </a:stretch>
+          <a:srcRect l="5534" r="16205" b="15012"/>
+          <a:stretch/>
         </p:blipFill>
         <p:spPr>
           <a:xfrm>
-            <a:off x="0" y="541000"/>
-            <a:ext cx="3600450" cy="2518449"/>
+            <a:off x="468" y="450330"/>
+            <a:ext cx="3605524" cy="2780549"/>
           </a:xfrm>
           <a:prstGeom prst="rect">
             <a:avLst/>

</xml_diff>